<commit_message>
added sponsor modal, updated profile page, added google auth and firebase
</commit_message>
<xml_diff>
--- a/presentation/deck-v3.pptx
+++ b/presentation/deck-v3.pptx
@@ -7,10 +7,10 @@
   <p:sldIdLst>
     <p:sldId id="256" r:id="rId2"/>
     <p:sldId id="257" r:id="rId3"/>
-    <p:sldId id="258" r:id="rId4"/>
-    <p:sldId id="259" r:id="rId5"/>
-    <p:sldId id="260" r:id="rId6"/>
-    <p:sldId id="261" r:id="rId7"/>
+    <p:sldId id="259" r:id="rId4"/>
+    <p:sldId id="260" r:id="rId5"/>
+    <p:sldId id="261" r:id="rId6"/>
+    <p:sldId id="258" r:id="rId7"/>
     <p:sldId id="262" r:id="rId8"/>
     <p:sldId id="268" r:id="rId9"/>
     <p:sldId id="270" r:id="rId10"/>
@@ -299,7 +299,7 @@
           <a:p>
             <a:fld id="{10470E96-EB59-B849-B4F9-04D796034BE6}" type="datetimeFigureOut">
               <a:rPr lang="en-US" smtClean="0"/>
-              <a:t>6/13/18</a:t>
+              <a:t>6/16/18</a:t>
             </a:fld>
             <a:endParaRPr lang="en-US"/>
           </a:p>
@@ -469,7 +469,7 @@
           <a:p>
             <a:fld id="{10470E96-EB59-B849-B4F9-04D796034BE6}" type="datetimeFigureOut">
               <a:rPr lang="en-US" smtClean="0"/>
-              <a:t>6/13/18</a:t>
+              <a:t>6/16/18</a:t>
             </a:fld>
             <a:endParaRPr lang="en-US"/>
           </a:p>
@@ -649,7 +649,7 @@
           <a:p>
             <a:fld id="{10470E96-EB59-B849-B4F9-04D796034BE6}" type="datetimeFigureOut">
               <a:rPr lang="en-US" smtClean="0"/>
-              <a:t>6/13/18</a:t>
+              <a:t>6/16/18</a:t>
             </a:fld>
             <a:endParaRPr lang="en-US"/>
           </a:p>
@@ -819,7 +819,7 @@
           <a:p>
             <a:fld id="{10470E96-EB59-B849-B4F9-04D796034BE6}" type="datetimeFigureOut">
               <a:rPr lang="en-US" smtClean="0"/>
-              <a:t>6/13/18</a:t>
+              <a:t>6/16/18</a:t>
             </a:fld>
             <a:endParaRPr lang="en-US"/>
           </a:p>
@@ -1065,7 +1065,7 @@
           <a:p>
             <a:fld id="{10470E96-EB59-B849-B4F9-04D796034BE6}" type="datetimeFigureOut">
               <a:rPr lang="en-US" smtClean="0"/>
-              <a:t>6/13/18</a:t>
+              <a:t>6/16/18</a:t>
             </a:fld>
             <a:endParaRPr lang="en-US"/>
           </a:p>
@@ -1353,7 +1353,7 @@
           <a:p>
             <a:fld id="{10470E96-EB59-B849-B4F9-04D796034BE6}" type="datetimeFigureOut">
               <a:rPr lang="en-US" smtClean="0"/>
-              <a:t>6/13/18</a:t>
+              <a:t>6/16/18</a:t>
             </a:fld>
             <a:endParaRPr lang="en-US"/>
           </a:p>
@@ -1775,7 +1775,7 @@
           <a:p>
             <a:fld id="{10470E96-EB59-B849-B4F9-04D796034BE6}" type="datetimeFigureOut">
               <a:rPr lang="en-US" smtClean="0"/>
-              <a:t>6/13/18</a:t>
+              <a:t>6/16/18</a:t>
             </a:fld>
             <a:endParaRPr lang="en-US"/>
           </a:p>
@@ -1893,7 +1893,7 @@
           <a:p>
             <a:fld id="{10470E96-EB59-B849-B4F9-04D796034BE6}" type="datetimeFigureOut">
               <a:rPr lang="en-US" smtClean="0"/>
-              <a:t>6/13/18</a:t>
+              <a:t>6/16/18</a:t>
             </a:fld>
             <a:endParaRPr lang="en-US"/>
           </a:p>
@@ -1988,7 +1988,7 @@
           <a:p>
             <a:fld id="{10470E96-EB59-B849-B4F9-04D796034BE6}" type="datetimeFigureOut">
               <a:rPr lang="en-US" smtClean="0"/>
-              <a:t>6/13/18</a:t>
+              <a:t>6/16/18</a:t>
             </a:fld>
             <a:endParaRPr lang="en-US"/>
           </a:p>
@@ -2265,7 +2265,7 @@
           <a:p>
             <a:fld id="{10470E96-EB59-B849-B4F9-04D796034BE6}" type="datetimeFigureOut">
               <a:rPr lang="en-US" smtClean="0"/>
-              <a:t>6/13/18</a:t>
+              <a:t>6/16/18</a:t>
             </a:fld>
             <a:endParaRPr lang="en-US"/>
           </a:p>
@@ -2518,7 +2518,7 @@
           <a:p>
             <a:fld id="{10470E96-EB59-B849-B4F9-04D796034BE6}" type="datetimeFigureOut">
               <a:rPr lang="en-US" smtClean="0"/>
-              <a:t>6/13/18</a:t>
+              <a:t>6/16/18</a:t>
             </a:fld>
             <a:endParaRPr lang="en-US"/>
           </a:p>
@@ -2731,7 +2731,7 @@
           <a:p>
             <a:fld id="{10470E96-EB59-B849-B4F9-04D796034BE6}" type="datetimeFigureOut">
               <a:rPr lang="en-US" smtClean="0"/>
-              <a:t>6/13/18</a:t>
+              <a:t>6/16/18</a:t>
             </a:fld>
             <a:endParaRPr lang="en-US"/>
           </a:p>
@@ -3418,11 +3418,15 @@
             </a:r>
             <a:r>
               <a:rPr lang="en-US" dirty="0" err="1" smtClean="0"/>
-              <a:t>Vue</a:t>
+              <a:t>VueJS</a:t>
             </a:r>
             <a:r>
               <a:rPr lang="en-US" dirty="0" smtClean="0"/>
-              <a:t> JS PWA</a:t>
+              <a:t> </a:t>
+            </a:r>
+            <a:r>
+              <a:rPr lang="en-US" dirty="0" smtClean="0"/>
+              <a:t>PWA</a:t>
             </a:r>
           </a:p>
           <a:p>
@@ -3629,7 +3633,9 @@
         </p:nvSpPr>
         <p:spPr/>
         <p:txBody>
-          <a:bodyPr/>
+          <a:bodyPr>
+            <a:normAutofit/>
+          </a:bodyPr>
           <a:lstStyle/>
           <a:p>
             <a:r>
@@ -3640,9 +3646,18 @@
           <a:p>
             <a:r>
               <a:rPr lang="en-US" dirty="0" smtClean="0"/>
-              <a:t>Restricts uneven distribution of access to critical infrastructure by monopoly service providers</a:t>
-            </a:r>
-            <a:endParaRPr lang="en-US" dirty="0"/>
+              <a:t>Restricts uneven distribution of access to critical infrastructure by monopoly service </a:t>
+            </a:r>
+            <a:r>
+              <a:rPr lang="en-US" dirty="0" smtClean="0"/>
+              <a:t>providers</a:t>
+            </a:r>
+          </a:p>
+          <a:p>
+            <a:r>
+              <a:rPr lang="en-US" dirty="0" smtClean="0"/>
+              <a:t>Some developing countries, such as Haiti, use the US dollar rather than their own currency</a:t>
+            </a:r>
           </a:p>
         </p:txBody>
       </p:sp>
@@ -3772,7 +3787,7 @@
           <a:p>
             <a:r>
               <a:rPr lang="en-US" dirty="0" smtClean="0"/>
-              <a:t>How it Works</a:t>
+              <a:t>Problem</a:t>
             </a:r>
             <a:endParaRPr lang="en-US" dirty="0"/>
           </a:p>
@@ -3790,44 +3805,23 @@
         </p:nvSpPr>
         <p:spPr/>
         <p:txBody>
-          <a:bodyPr>
-            <a:normAutofit fontScale="92500" lnSpcReduction="10000"/>
-          </a:bodyPr>
-          <a:lstStyle/>
-          <a:p>
-            <a:pPr marL="734749" indent="-734749">
-              <a:buAutoNum type="arabicPeriod"/>
+          <a:bodyPr/>
+          <a:lstStyle/>
+          <a:p>
+            <a:pPr marL="0" indent="0">
+              <a:buNone/>
             </a:pPr>
             <a:r>
               <a:rPr lang="en-US" dirty="0" smtClean="0"/>
-              <a:t>Alice posts a job that is directly tied to a social good (e.g. trash pick up and deposit)</a:t>
-            </a:r>
-          </a:p>
-          <a:p>
-            <a:pPr marL="734749" indent="-734749">
-              <a:buAutoNum type="arabicPeriod"/>
-            </a:pPr>
-            <a:r>
-              <a:rPr lang="en-US" dirty="0" smtClean="0"/>
-              <a:t>Bob claims Alice’s job, completes the work and provides proof the work was completed</a:t>
-            </a:r>
-          </a:p>
-          <a:p>
-            <a:pPr marL="734749" indent="-734749">
-              <a:buAutoNum type="arabicPeriod"/>
-            </a:pPr>
-            <a:r>
-              <a:rPr lang="en-US" dirty="0" smtClean="0"/>
-              <a:t>The community benefits from the social good (i.e. consistent neighborhood garbage pick up); Alice found dedicated workers; and Bob now has earnings and a resume</a:t>
-            </a:r>
-            <a:endParaRPr lang="en-US" dirty="0"/>
+              <a:t>Everyday citizens of developing countries need access to “critical infrastructure” (i.e. education, sanitation, transportation, public services).</a:t>
+            </a:r>
           </a:p>
         </p:txBody>
       </p:sp>
     </p:spTree>
     <p:extLst>
       <p:ext uri="{BB962C8B-B14F-4D97-AF65-F5344CB8AC3E}">
-        <p14:creationId xmlns:p14="http://schemas.microsoft.com/office/powerpoint/2010/main" val="3354384775"/>
+        <p14:creationId xmlns:p14="http://schemas.microsoft.com/office/powerpoint/2010/main" val="220732754"/>
       </p:ext>
     </p:extLst>
   </p:cSld>
@@ -3871,7 +3865,7 @@
           <a:p>
             <a:r>
               <a:rPr lang="en-US" dirty="0" smtClean="0"/>
-              <a:t>Customer Need</a:t>
+              <a:t>Insight</a:t>
             </a:r>
             <a:endParaRPr lang="en-US" dirty="0"/>
           </a:p>
@@ -3897,15 +3891,31 @@
             </a:pPr>
             <a:r>
               <a:rPr lang="en-US" dirty="0" smtClean="0"/>
-              <a:t>Everyday citizens of developing countries need access to “critical infrastructure” (i.e. education, sanitation, transportation, public services).</a:t>
-            </a:r>
+              <a:t>Governments of developing nations cannot provide consistent public services (aka “critical infrastructure,” such as sanitation, transportation, education and more).</a:t>
+            </a:r>
+          </a:p>
+          <a:p>
+            <a:pPr marL="0" indent="0">
+              <a:buNone/>
+            </a:pPr>
+            <a:endParaRPr lang="en-US" dirty="0"/>
+          </a:p>
+          <a:p>
+            <a:pPr marL="0" indent="0">
+              <a:buNone/>
+            </a:pPr>
+            <a:r>
+              <a:rPr lang="en-US" dirty="0" smtClean="0"/>
+              <a:t>...But everyday citizens are skilled to complete the work</a:t>
+            </a:r>
+            <a:endParaRPr lang="en-US" dirty="0"/>
           </a:p>
         </p:txBody>
       </p:sp>
     </p:spTree>
     <p:extLst>
       <p:ext uri="{BB962C8B-B14F-4D97-AF65-F5344CB8AC3E}">
-        <p14:creationId xmlns:p14="http://schemas.microsoft.com/office/powerpoint/2010/main" val="220732754"/>
+        <p14:creationId xmlns:p14="http://schemas.microsoft.com/office/powerpoint/2010/main" val="137516146"/>
       </p:ext>
     </p:extLst>
   </p:cSld>
@@ -3949,7 +3959,7 @@
           <a:p>
             <a:r>
               <a:rPr lang="en-US" dirty="0" smtClean="0"/>
-              <a:t>Insight</a:t>
+              <a:t>What We Do to Solve this Problem</a:t>
             </a:r>
             <a:endParaRPr lang="en-US" dirty="0"/>
           </a:p>
@@ -3967,30 +3977,33 @@
         </p:nvSpPr>
         <p:spPr/>
         <p:txBody>
-          <a:bodyPr/>
-          <a:lstStyle/>
-          <a:p>
-            <a:pPr marL="0" indent="0">
-              <a:buNone/>
-            </a:pPr>
+          <a:bodyPr>
+            <a:normAutofit fontScale="85000" lnSpcReduction="10000"/>
+          </a:bodyPr>
+          <a:lstStyle/>
+          <a:p>
             <a:r>
               <a:rPr lang="en-US" dirty="0" smtClean="0"/>
-              <a:t>Governments of developing nations cannot provide consistent public services (aka “critical infrastructure,” such as sanitation, transportation, education and more).</a:t>
-            </a:r>
-          </a:p>
-          <a:p>
-            <a:pPr marL="0" indent="0">
-              <a:buNone/>
-            </a:pPr>
+              <a:t>Travay is a token that can be earned through good deeds such as reading to a child or delivering water to those in need</a:t>
+            </a:r>
+          </a:p>
+          <a:p>
+            <a:r>
+              <a:rPr lang="en-US" dirty="0" smtClean="0"/>
+              <a:t>Citizens post the good deeds and others within the community claim these “bounties” to help improve the community</a:t>
+            </a:r>
+          </a:p>
+          <a:p>
+            <a:r>
+              <a:rPr lang="en-US" dirty="0" smtClean="0"/>
+              <a:t>Tokens (rewards from the bounties) can be liquidated for food and services</a:t>
+            </a:r>
             <a:endParaRPr lang="en-US" dirty="0"/>
           </a:p>
           <a:p>
-            <a:pPr marL="0" indent="0">
-              <a:buNone/>
-            </a:pPr>
             <a:r>
               <a:rPr lang="en-US" dirty="0" smtClean="0"/>
-              <a:t>...But everyday citizens are skilled to complete the work</a:t>
+              <a:t>Experience from the deeds are curated into a resume for further economic mobility</a:t>
             </a:r>
             <a:endParaRPr lang="en-US" dirty="0"/>
           </a:p>
@@ -3999,7 +4012,7 @@
     </p:spTree>
     <p:extLst>
       <p:ext uri="{BB962C8B-B14F-4D97-AF65-F5344CB8AC3E}">
-        <p14:creationId xmlns:p14="http://schemas.microsoft.com/office/powerpoint/2010/main" val="137516146"/>
+        <p14:creationId xmlns:p14="http://schemas.microsoft.com/office/powerpoint/2010/main" val="1862304660"/>
       </p:ext>
     </p:extLst>
   </p:cSld>
@@ -4043,7 +4056,7 @@
           <a:p>
             <a:r>
               <a:rPr lang="en-US" dirty="0" smtClean="0"/>
-              <a:t>Solution</a:t>
+              <a:t>How it Works</a:t>
             </a:r>
             <a:endParaRPr lang="en-US" dirty="0"/>
           </a:p>
@@ -4062,32 +4075,34 @@
         <p:spPr/>
         <p:txBody>
           <a:bodyPr>
-            <a:normAutofit fontScale="85000" lnSpcReduction="10000"/>
+            <a:normAutofit fontScale="92500" lnSpcReduction="10000"/>
           </a:bodyPr>
           <a:lstStyle/>
           <a:p>
+            <a:pPr marL="734749" indent="-734749">
+              <a:buAutoNum type="arabicPeriod"/>
+            </a:pPr>
             <a:r>
               <a:rPr lang="en-US" dirty="0" smtClean="0"/>
-              <a:t>Travay is a token that can be earned through good deeds such as reading to a child or delivering water to those in need</a:t>
-            </a:r>
-          </a:p>
-          <a:p>
+              <a:t>Alice posts a job that is directly tied to a social good (e.g. trash pick up and deposit)</a:t>
+            </a:r>
+          </a:p>
+          <a:p>
+            <a:pPr marL="734749" indent="-734749">
+              <a:buAutoNum type="arabicPeriod"/>
+            </a:pPr>
             <a:r>
               <a:rPr lang="en-US" dirty="0" smtClean="0"/>
-              <a:t>Citizens post the good deeds and others within the community claim these “bounties” to help improve the community</a:t>
-            </a:r>
-          </a:p>
-          <a:p>
+              <a:t>Bob claims Alice’s job, completes the work and provides proof the work was completed</a:t>
+            </a:r>
+          </a:p>
+          <a:p>
+            <a:pPr marL="734749" indent="-734749">
+              <a:buAutoNum type="arabicPeriod"/>
+            </a:pPr>
             <a:r>
               <a:rPr lang="en-US" dirty="0" smtClean="0"/>
-              <a:t>Tokens (rewards from the bounties) can be liquidated for food and services</a:t>
-            </a:r>
-            <a:endParaRPr lang="en-US" dirty="0"/>
-          </a:p>
-          <a:p>
-            <a:r>
-              <a:rPr lang="en-US" dirty="0" smtClean="0"/>
-              <a:t>Experience from the deeds are curated into a resume for further economic mobility</a:t>
+              <a:t>The community benefits from the social good (i.e. consistent neighborhood garbage pick up); Alice found dedicated workers; and Bob now has earnings and a resume</a:t>
             </a:r>
             <a:endParaRPr lang="en-US" dirty="0"/>
           </a:p>
@@ -4096,7 +4111,7 @@
     </p:spTree>
     <p:extLst>
       <p:ext uri="{BB962C8B-B14F-4D97-AF65-F5344CB8AC3E}">
-        <p14:creationId xmlns:p14="http://schemas.microsoft.com/office/powerpoint/2010/main" val="1862304660"/>
+        <p14:creationId xmlns:p14="http://schemas.microsoft.com/office/powerpoint/2010/main" val="3354384775"/>
       </p:ext>
     </p:extLst>
   </p:cSld>
@@ -4298,7 +4313,15 @@
           <a:p>
             <a:r>
               <a:rPr lang="en-US" dirty="0" smtClean="0"/>
-              <a:t>How We Make Money</a:t>
+              <a:t>How </a:t>
+            </a:r>
+            <a:r>
+              <a:rPr lang="en-US" dirty="0" smtClean="0"/>
+              <a:t>Travay Colony Make </a:t>
+            </a:r>
+            <a:r>
+              <a:rPr lang="en-US" dirty="0" smtClean="0"/>
+              <a:t>Money</a:t>
             </a:r>
             <a:endParaRPr lang="en-US" dirty="0"/>
           </a:p>

</xml_diff>